<commit_message>
removed youtube link. updated rmarkdown link.
</commit_message>
<xml_diff>
--- a/Results and Presentation/presentation.pptx
+++ b/Results and Presentation/presentation.pptx
@@ -5216,24 +5216,19 @@
             </a:r>
             <a:r>
               <a:rPr lang="en-US" sz="1600" i="1" dirty="0"/>
-              <a:t>, see </a:t>
-            </a:r>
-            <a:r>
-              <a:rPr lang="en-US" sz="1600" i="1" dirty="0">
+              <a:t>, </a:t>
+            </a:r>
+            <a:r>
+              <a:rPr lang="en-US" sz="1600" i="1"/>
+              <a:t>see </a:t>
+            </a:r>
+            <a:r>
+              <a:rPr lang="en-US" sz="1600" i="1">
                 <a:hlinkClick r:id="rId3"/>
               </a:rPr>
               <a:t>link</a:t>
             </a:r>
             <a:endParaRPr lang="en-US" sz="1600" i="1" dirty="0"/>
-          </a:p>
-          <a:p>
-            <a:r>
-              <a:rPr lang="en-US" sz="1600" i="1" dirty="0"/>
-              <a:t>For a link to the video, see </a:t>
-            </a:r>
-          </a:p>
-          <a:p>
-            <a:endParaRPr lang="en-US" dirty="0"/>
           </a:p>
         </p:txBody>
       </p:sp>

</xml_diff>